<commit_message>
css layout 1 have been modified
</commit_message>
<xml_diff>
--- a/1-html-css/04. CSS3 레이아웃 및 스타일 속성(2).pptx
+++ b/1-html-css/04. CSS3 레이아웃 및 스타일 속성(2).pptx
@@ -3627,11 +3627,7 @@
           <a:p>
             <a:r>
               <a:rPr lang="en-US" altLang="ko-KR" dirty="0" smtClean="0"/>
-              <a:t>4.</a:t>
-            </a:r>
-            <a:r>
-              <a:rPr lang="en-US" altLang="ko-KR" dirty="0" smtClean="0"/>
-              <a:t> </a:t>
+              <a:t>4. </a:t>
             </a:r>
             <a:r>
               <a:rPr lang="ko-KR" altLang="en-US" dirty="0" smtClean="0"/>
@@ -3919,30 +3915,6 @@
           </a:p>
         </p:txBody>
       </p:sp>
-      <p:pic>
-        <p:nvPicPr>
-          <p:cNvPr id="4" name="그림 3"/>
-          <p:cNvPicPr>
-            <a:picLocks noChangeAspect="1"/>
-          </p:cNvPicPr>
-          <p:nvPr/>
-        </p:nvPicPr>
-        <p:blipFill>
-          <a:blip r:embed="rId3"/>
-          <a:stretch>
-            <a:fillRect/>
-          </a:stretch>
-        </p:blipFill>
-        <p:spPr>
-          <a:xfrm>
-            <a:off x="5292080" y="1222064"/>
-            <a:ext cx="3240360" cy="5439805"/>
-          </a:xfrm>
-          <a:prstGeom prst="rect">
-            <a:avLst/>
-          </a:prstGeom>
-        </p:spPr>
-      </p:pic>
       <p:graphicFrame>
         <p:nvGraphicFramePr>
           <p:cNvPr id="5" name="표 4"/>
@@ -4123,6 +4095,30 @@
           </a:graphicData>
         </a:graphic>
       </p:graphicFrame>
+      <p:pic>
+        <p:nvPicPr>
+          <p:cNvPr id="6" name="그림 5"/>
+          <p:cNvPicPr>
+            <a:picLocks noChangeAspect="1"/>
+          </p:cNvPicPr>
+          <p:nvPr/>
+        </p:nvPicPr>
+        <p:blipFill>
+          <a:blip r:embed="rId3"/>
+          <a:stretch>
+            <a:fillRect/>
+          </a:stretch>
+        </p:blipFill>
+        <p:spPr>
+          <a:xfrm>
+            <a:off x="5148064" y="1613003"/>
+            <a:ext cx="3726820" cy="4882873"/>
+          </a:xfrm>
+          <a:prstGeom prst="rect">
+            <a:avLst/>
+          </a:prstGeom>
+        </p:spPr>
+      </p:pic>
     </p:spTree>
     <p:extLst>
       <p:ext uri="{BB962C8B-B14F-4D97-AF65-F5344CB8AC3E}">
@@ -5565,11 +5561,7 @@
             </a:r>
             <a:r>
               <a:rPr lang="en-US" altLang="ko-KR" dirty="0" smtClean="0"/>
-              <a:t> Module </a:t>
-            </a:r>
-            <a:r>
-              <a:rPr lang="en-US" altLang="ko-KR" dirty="0" smtClean="0"/>
-              <a:t>7</a:t>
+              <a:t> Module 7</a:t>
             </a:r>
             <a:endParaRPr lang="ko-KR" altLang="en-US" dirty="0"/>
           </a:p>
@@ -5649,11 +5641,7 @@
           <a:p>
             <a:r>
               <a:rPr lang="en-US" altLang="ko-KR" dirty="0" smtClean="0"/>
-              <a:t>1.</a:t>
-            </a:r>
-            <a:r>
-              <a:rPr lang="en-US" altLang="ko-KR" dirty="0" smtClean="0"/>
-              <a:t> </a:t>
+              <a:t>1. </a:t>
             </a:r>
             <a:r>
               <a:rPr lang="ko-KR" altLang="en-US" dirty="0" smtClean="0"/>
@@ -5723,11 +5711,7 @@
             </a:r>
             <a:r>
               <a:rPr lang="ko-KR" altLang="en-US" dirty="0" smtClean="0"/>
-              <a:t>기준 위치를</a:t>
-            </a:r>
-            <a:r>
-              <a:rPr lang="ko-KR" altLang="en-US" dirty="0" smtClean="0"/>
-              <a:t> 선택한 요소로 변경</a:t>
+              <a:t>기준 위치를 선택한 요소로 변경</a:t>
             </a:r>
             <a:endParaRPr lang="en-US" altLang="ko-KR" dirty="0" smtClean="0"/>
           </a:p>
@@ -5755,15 +5739,7 @@
             </a:r>
             <a:r>
               <a:rPr lang="ko-KR" altLang="en-US" dirty="0" smtClean="0"/>
-              <a:t>기준 </a:t>
-            </a:r>
-            <a:r>
-              <a:rPr lang="ko-KR" altLang="en-US" dirty="0" smtClean="0"/>
-              <a:t>절대 </a:t>
-            </a:r>
-            <a:r>
-              <a:rPr lang="ko-KR" altLang="en-US" dirty="0" smtClean="0"/>
-              <a:t>위치 좌표를 설정</a:t>
+              <a:t>기준 절대 위치 좌표를 설정</a:t>
             </a:r>
             <a:endParaRPr lang="en-US" altLang="ko-KR" dirty="0" smtClean="0"/>
           </a:p>
@@ -6004,11 +5980,7 @@
           <a:p>
             <a:r>
               <a:rPr lang="en-US" altLang="ko-KR" dirty="0" smtClean="0"/>
-              <a:t>1.</a:t>
-            </a:r>
-            <a:r>
-              <a:rPr lang="en-US" altLang="ko-KR" dirty="0" smtClean="0"/>
-              <a:t> </a:t>
+              <a:t>1. </a:t>
             </a:r>
             <a:r>
               <a:rPr lang="ko-KR" altLang="en-US" dirty="0" smtClean="0"/>
@@ -6146,11 +6118,7 @@
           <a:p>
             <a:r>
               <a:rPr lang="en-US" altLang="ko-KR" dirty="0" smtClean="0"/>
-              <a:t>1.</a:t>
-            </a:r>
-            <a:r>
-              <a:rPr lang="en-US" altLang="ko-KR" dirty="0" smtClean="0"/>
-              <a:t> </a:t>
+              <a:t>1. </a:t>
             </a:r>
             <a:r>
               <a:rPr lang="ko-KR" altLang="en-US" dirty="0" smtClean="0"/>
@@ -6236,11 +6204,7 @@
             </a:r>
             <a:r>
               <a:rPr lang="en-US" altLang="ko-KR" dirty="0" err="1" smtClean="0"/>
-              <a:t>5</a:t>
-            </a:r>
-            <a:r>
-              <a:rPr lang="en-US" altLang="ko-KR" dirty="0" err="1" smtClean="0"/>
-              <a:t>.html</a:t>
+              <a:t>5.html</a:t>
             </a:r>
             <a:endParaRPr lang="en-US" altLang="ko-KR" dirty="0" smtClean="0"/>
           </a:p>
@@ -6293,15 +6257,7 @@
           <a:p>
             <a:r>
               <a:rPr lang="en-US" altLang="ko-KR" dirty="0" smtClean="0"/>
-              <a:t>2.</a:t>
-            </a:r>
-            <a:r>
-              <a:rPr lang="en-US" altLang="ko-KR" dirty="0" smtClean="0"/>
-              <a:t> </a:t>
-            </a:r>
-            <a:r>
-              <a:rPr lang="en-US" altLang="ko-KR" dirty="0" smtClean="0"/>
-              <a:t>float </a:t>
+              <a:t>2. float </a:t>
             </a:r>
             <a:r>
               <a:rPr lang="ko-KR" altLang="en-US" dirty="0" smtClean="0"/>
@@ -6381,7 +6337,6 @@
               <a:rPr lang="en-US" altLang="ko-KR" dirty="0" smtClean="0"/>
               <a:t>. </a:t>
             </a:r>
-            <a:endParaRPr lang="en-US" altLang="ko-KR" dirty="0" smtClean="0"/>
           </a:p>
           <a:p>
             <a:pPr lvl="1"/>
@@ -6403,11 +6358,7 @@
             <a:pPr lvl="1"/>
             <a:r>
               <a:rPr lang="ko-KR" altLang="en-US" dirty="0" smtClean="0"/>
-              <a:t>웹 </a:t>
-            </a:r>
-            <a:r>
-              <a:rPr lang="ko-KR" altLang="en-US" dirty="0" smtClean="0"/>
-              <a:t>페이지의 레이아웃을 만들 때 많이 사용</a:t>
+              <a:t>웹 페이지의 레이아웃을 만들 때 많이 사용</a:t>
             </a:r>
           </a:p>
           <a:p>
@@ -6475,15 +6426,7 @@
           <a:p>
             <a:r>
               <a:rPr lang="en-US" altLang="ko-KR" dirty="0" smtClean="0"/>
-              <a:t>2.</a:t>
-            </a:r>
-            <a:r>
-              <a:rPr lang="en-US" altLang="ko-KR" dirty="0" smtClean="0"/>
-              <a:t> </a:t>
-            </a:r>
-            <a:r>
-              <a:rPr lang="en-US" altLang="ko-KR" dirty="0" smtClean="0"/>
-              <a:t>float </a:t>
+              <a:t>2. float </a:t>
             </a:r>
             <a:r>
               <a:rPr lang="ko-KR" altLang="en-US" dirty="0" smtClean="0"/>
@@ -6579,11 +6522,7 @@
             </a:r>
             <a:r>
               <a:rPr lang="en-US" altLang="ko-KR" dirty="0" err="1" smtClean="0"/>
-              <a:t>8</a:t>
-            </a:r>
-            <a:r>
-              <a:rPr lang="en-US" altLang="ko-KR" dirty="0" err="1" smtClean="0"/>
-              <a:t>.html</a:t>
+              <a:t>8.html</a:t>
             </a:r>
             <a:endParaRPr lang="en-US" altLang="ko-KR" dirty="0" smtClean="0"/>
           </a:p>
@@ -6603,11 +6542,7 @@
             </a:r>
             <a:r>
               <a:rPr lang="ko-KR" altLang="en-US" dirty="0" smtClean="0"/>
-              <a:t>로 </a:t>
-            </a:r>
-            <a:r>
-              <a:rPr lang="ko-KR" altLang="en-US" dirty="0" smtClean="0"/>
-              <a:t>적용</a:t>
+              <a:t>로 적용</a:t>
             </a:r>
             <a:endParaRPr lang="en-US" altLang="ko-KR" dirty="0" smtClean="0"/>
           </a:p>
@@ -6625,7 +6560,6 @@
               <a:rPr lang="en-US" altLang="ko-KR" dirty="0" smtClean="0"/>
               <a:t>()</a:t>
             </a:r>
-            <a:endParaRPr lang="en-US" altLang="ko-KR" dirty="0" smtClean="0"/>
           </a:p>
         </p:txBody>
       </p:sp>
@@ -6856,11 +6790,7 @@
           <a:p>
             <a:r>
               <a:rPr lang="en-US" altLang="ko-KR" dirty="0" smtClean="0"/>
-              <a:t>3.</a:t>
-            </a:r>
-            <a:r>
-              <a:rPr lang="en-US" altLang="ko-KR" dirty="0" smtClean="0"/>
-              <a:t> </a:t>
+              <a:t>3. </a:t>
             </a:r>
             <a:r>
               <a:rPr lang="ko-KR" altLang="en-US" dirty="0" smtClean="0"/>
@@ -6916,11 +6846,7 @@
             <a:pPr lvl="1"/>
             <a:r>
               <a:rPr lang="en-US" altLang="ko-KR" dirty="0" smtClean="0"/>
-              <a:t>block</a:t>
-            </a:r>
-            <a:r>
-              <a:rPr lang="en-US" altLang="ko-KR" dirty="0" smtClean="0"/>
-              <a:t>: </a:t>
+              <a:t>block: </a:t>
             </a:r>
             <a:r>
               <a:rPr lang="ko-KR" altLang="en-US" dirty="0" smtClean="0"/>
@@ -6951,11 +6877,7 @@
             <a:pPr lvl="1"/>
             <a:r>
               <a:rPr lang="en-US" altLang="ko-KR" dirty="0" smtClean="0"/>
-              <a:t>inline</a:t>
-            </a:r>
-            <a:r>
-              <a:rPr lang="en-US" altLang="ko-KR" dirty="0" smtClean="0"/>
-              <a:t>: </a:t>
+              <a:t>inline: </a:t>
             </a:r>
             <a:r>
               <a:rPr lang="ko-KR" altLang="en-US" dirty="0" smtClean="0"/>
@@ -6989,17 +6911,12 @@
               <a:rPr lang="en-US" altLang="ko-KR" dirty="0" smtClean="0"/>
               <a:t>.</a:t>
             </a:r>
-            <a:endParaRPr lang="en-US" altLang="ko-KR" dirty="0" smtClean="0"/>
-          </a:p>
-          <a:p>
-            <a:pPr lvl="1"/>
-            <a:r>
-              <a:rPr lang="en-US" altLang="ko-KR" dirty="0" smtClean="0"/>
-              <a:t>inline-block: </a:t>
-            </a:r>
-            <a:r>
-              <a:rPr lang="en-US" altLang="ko-KR" dirty="0" smtClean="0"/>
-              <a:t>inline</a:t>
+          </a:p>
+          <a:p>
+            <a:pPr lvl="1"/>
+            <a:r>
+              <a:rPr lang="en-US" altLang="ko-KR" dirty="0" smtClean="0"/>
+              <a:t>inline-block: inline</a:t>
             </a:r>
             <a:r>
               <a:rPr lang="ko-KR" altLang="en-US" dirty="0" err="1" smtClean="0"/>
@@ -7090,11 +7007,7 @@
           <a:p>
             <a:r>
               <a:rPr lang="en-US" altLang="ko-KR" dirty="0" smtClean="0"/>
-              <a:t>3.</a:t>
-            </a:r>
-            <a:r>
-              <a:rPr lang="en-US" altLang="ko-KR" dirty="0" smtClean="0"/>
-              <a:t> </a:t>
+              <a:t>3. </a:t>
             </a:r>
             <a:r>
               <a:rPr lang="ko-KR" altLang="en-US" dirty="0" smtClean="0"/>

</xml_diff>